<commit_message>
powerpoint changes -- benefits
</commit_message>
<xml_diff>
--- a/Mozilla Firefox.pptx
+++ b/Mozilla Firefox.pptx
@@ -1,6 +1,6 @@
 
 <file path=ppt/presentation.xml><?xml version="1.0" encoding="utf-8"?>
-<p:presentation xmlns:a="http://schemas.openxmlformats.org/drawingml/2006/main" xmlns:r="http://schemas.openxmlformats.org/officeDocument/2006/relationships" xmlns:p="http://schemas.openxmlformats.org/presentationml/2006/main" autoCompressPictures="0">
+<p:presentation xmlns:a="http://schemas.openxmlformats.org/drawingml/2006/main" xmlns:r="http://schemas.openxmlformats.org/officeDocument/2006/relationships" xmlns:p="http://schemas.openxmlformats.org/presentationml/2006/main" saveSubsetFonts="1" autoCompressPictures="0">
   <p:sldMasterIdLst>
     <p:sldMasterId id="2147483648" r:id="rId1"/>
   </p:sldMasterIdLst>
@@ -13,7 +13,8 @@
     <p:sldId id="260" r:id="rId7"/>
     <p:sldId id="262" r:id="rId8"/>
     <p:sldId id="264" r:id="rId9"/>
-    <p:sldId id="263" r:id="rId10"/>
+    <p:sldId id="265" r:id="rId10"/>
+    <p:sldId id="263" r:id="rId11"/>
   </p:sldIdLst>
   <p:sldSz cx="12192000" cy="6858000"/>
   <p:notesSz cx="6858000" cy="9144000"/>
@@ -866,7 +867,7 @@
             <a:fld id="{B61BEF0D-F0BB-DE4B-95CE-6DB70DBA9567}" type="datetimeFigureOut">
               <a:rPr lang="en-US" dirty="0"/>
               <a:pPr/>
-              <a:t>11/28/2016</a:t>
+              <a:t>11/29/16</a:t>
             </a:fld>
             <a:endParaRPr lang="en-US" dirty="0"/>
           </a:p>
@@ -1114,7 +1115,7 @@
             <a:fld id="{B61BEF0D-F0BB-DE4B-95CE-6DB70DBA9567}" type="datetimeFigureOut">
               <a:rPr lang="en-US" dirty="0"/>
               <a:pPr/>
-              <a:t>11/28/2016</a:t>
+              <a:t>11/29/16</a:t>
             </a:fld>
             <a:endParaRPr lang="en-US" dirty="0"/>
           </a:p>
@@ -1425,7 +1426,7 @@
             <a:fld id="{B61BEF0D-F0BB-DE4B-95CE-6DB70DBA9567}" type="datetimeFigureOut">
               <a:rPr lang="en-US" dirty="0"/>
               <a:pPr/>
-              <a:t>11/28/2016</a:t>
+              <a:t>11/29/16</a:t>
             </a:fld>
             <a:endParaRPr lang="en-US" dirty="0"/>
           </a:p>
@@ -1755,7 +1756,7 @@
             <a:fld id="{B61BEF0D-F0BB-DE4B-95CE-6DB70DBA9567}" type="datetimeFigureOut">
               <a:rPr lang="en-US" dirty="0"/>
               <a:pPr/>
-              <a:t>11/28/2016</a:t>
+              <a:t>11/29/16</a:t>
             </a:fld>
             <a:endParaRPr lang="en-US" dirty="0"/>
           </a:p>
@@ -2066,7 +2067,7 @@
             <a:fld id="{B61BEF0D-F0BB-DE4B-95CE-6DB70DBA9567}" type="datetimeFigureOut">
               <a:rPr lang="en-US" dirty="0"/>
               <a:pPr/>
-              <a:t>11/28/2016</a:t>
+              <a:t>11/29/16</a:t>
             </a:fld>
             <a:endParaRPr lang="en-US" dirty="0"/>
           </a:p>
@@ -2456,7 +2457,7 @@
             <a:fld id="{B61BEF0D-F0BB-DE4B-95CE-6DB70DBA9567}" type="datetimeFigureOut">
               <a:rPr lang="en-US" dirty="0"/>
               <a:pPr/>
-              <a:t>11/28/2016</a:t>
+              <a:t>11/29/16</a:t>
             </a:fld>
             <a:endParaRPr lang="en-US" dirty="0"/>
           </a:p>
@@ -2622,7 +2623,7 @@
           <a:p>
             <a:fld id="{55C6B4A9-1611-4792-9094-5F34BCA07E0B}" type="datetimeFigureOut">
               <a:rPr lang="en-US" dirty="0"/>
-              <a:t>11/28/2016</a:t>
+              <a:t>11/29/16</a:t>
             </a:fld>
             <a:endParaRPr lang="en-US" dirty="0"/>
           </a:p>
@@ -2798,7 +2799,7 @@
             <a:fld id="{B61BEF0D-F0BB-DE4B-95CE-6DB70DBA9567}" type="datetimeFigureOut">
               <a:rPr lang="en-US" dirty="0"/>
               <a:pPr/>
-              <a:t>11/28/2016</a:t>
+              <a:t>11/29/16</a:t>
             </a:fld>
             <a:endParaRPr lang="en-US" dirty="0"/>
           </a:p>
@@ -2964,7 +2965,7 @@
           <a:p>
             <a:fld id="{42A54C80-263E-416B-A8E0-580EDEADCBDC}" type="datetimeFigureOut">
               <a:rPr lang="en-US" dirty="0"/>
-              <a:t>11/28/2016</a:t>
+              <a:t>11/29/16</a:t>
             </a:fld>
             <a:endParaRPr lang="en-US" dirty="0"/>
           </a:p>
@@ -3207,7 +3208,7 @@
             <a:fld id="{B61BEF0D-F0BB-DE4B-95CE-6DB70DBA9567}" type="datetimeFigureOut">
               <a:rPr lang="en-US" dirty="0"/>
               <a:pPr/>
-              <a:t>11/28/2016</a:t>
+              <a:t>11/29/16</a:t>
             </a:fld>
             <a:endParaRPr lang="en-US" dirty="0"/>
           </a:p>
@@ -3435,7 +3436,7 @@
           <a:p>
             <a:fld id="{42A54C80-263E-416B-A8E0-580EDEADCBDC}" type="datetimeFigureOut">
               <a:rPr lang="en-US" dirty="0"/>
-              <a:t>11/28/2016</a:t>
+              <a:t>11/29/16</a:t>
             </a:fld>
             <a:endParaRPr lang="en-US" dirty="0"/>
           </a:p>
@@ -3805,7 +3806,7 @@
             <a:fld id="{B61BEF0D-F0BB-DE4B-95CE-6DB70DBA9567}" type="datetimeFigureOut">
               <a:rPr lang="en-US" dirty="0"/>
               <a:pPr/>
-              <a:t>11/28/2016</a:t>
+              <a:t>11/29/16</a:t>
             </a:fld>
             <a:endParaRPr lang="en-US" dirty="0"/>
           </a:p>
@@ -3925,7 +3926,7 @@
             <a:fld id="{B61BEF0D-F0BB-DE4B-95CE-6DB70DBA9567}" type="datetimeFigureOut">
               <a:rPr lang="en-US" dirty="0"/>
               <a:pPr/>
-              <a:t>11/28/2016</a:t>
+              <a:t>11/29/16</a:t>
             </a:fld>
             <a:endParaRPr lang="en-US" dirty="0"/>
           </a:p>
@@ -4017,7 +4018,7 @@
             <a:fld id="{B61BEF0D-F0BB-DE4B-95CE-6DB70DBA9567}" type="datetimeFigureOut">
               <a:rPr lang="en-US" dirty="0"/>
               <a:pPr/>
-              <a:t>11/28/2016</a:t>
+              <a:t>11/29/16</a:t>
             </a:fld>
             <a:endParaRPr lang="en-US" dirty="0"/>
           </a:p>
@@ -4268,7 +4269,7 @@
           <a:p>
             <a:fld id="{42A54C80-263E-416B-A8E0-580EDEADCBDC}" type="datetimeFigureOut">
               <a:rPr lang="en-US" dirty="0"/>
-              <a:t>11/28/2016</a:t>
+              <a:t>11/29/16</a:t>
             </a:fld>
             <a:endParaRPr lang="en-US" dirty="0"/>
           </a:p>
@@ -4570,7 +4571,7 @@
             <a:fld id="{B61BEF0D-F0BB-DE4B-95CE-6DB70DBA9567}" type="datetimeFigureOut">
               <a:rPr lang="en-US" dirty="0"/>
               <a:pPr/>
-              <a:t>11/28/2016</a:t>
+              <a:t>11/29/16</a:t>
             </a:fld>
             <a:endParaRPr lang="en-US" dirty="0"/>
           </a:p>
@@ -5268,7 +5269,7 @@
             <a:fld id="{B61BEF0D-F0BB-DE4B-95CE-6DB70DBA9567}" type="datetimeFigureOut">
               <a:rPr lang="en-US" dirty="0"/>
               <a:pPr/>
-              <a:t>11/28/2016</a:t>
+              <a:t>11/29/16</a:t>
             </a:fld>
             <a:endParaRPr lang="en-US" dirty="0"/>
           </a:p>
@@ -5891,6 +5892,179 @@
 </p:sld>
 </file>
 
+<file path=ppt/slides/slide10.xml><?xml version="1.0" encoding="utf-8"?>
+<p:sld xmlns:a="http://schemas.openxmlformats.org/drawingml/2006/main" xmlns:r="http://schemas.openxmlformats.org/officeDocument/2006/relationships" xmlns:p="http://schemas.openxmlformats.org/presentationml/2006/main">
+  <p:cSld>
+    <p:spTree>
+      <p:nvGrpSpPr>
+        <p:cNvPr id="1" name=""/>
+        <p:cNvGrpSpPr/>
+        <p:nvPr/>
+      </p:nvGrpSpPr>
+      <p:grpSpPr>
+        <a:xfrm>
+          <a:off x="0" y="0"/>
+          <a:ext cx="0" cy="0"/>
+          <a:chOff x="0" y="0"/>
+          <a:chExt cx="0" cy="0"/>
+        </a:xfrm>
+      </p:grpSpPr>
+      <p:sp>
+        <p:nvSpPr>
+          <p:cNvPr id="2" name="Title 1"/>
+          <p:cNvSpPr>
+            <a:spLocks noGrp="1"/>
+          </p:cNvSpPr>
+          <p:nvPr>
+            <p:ph type="title"/>
+          </p:nvPr>
+        </p:nvSpPr>
+        <p:spPr/>
+        <p:txBody>
+          <a:bodyPr/>
+          <a:lstStyle/>
+          <a:p>
+            <a:r>
+              <a:rPr lang="en-US" dirty="0"/>
+              <a:t>Critical </a:t>
+            </a:r>
+            <a:r>
+              <a:rPr lang="en-US" dirty="0" smtClean="0"/>
+              <a:t>Analysis -- Drawbacks</a:t>
+            </a:r>
+            <a:endParaRPr lang="en-US" dirty="0"/>
+          </a:p>
+        </p:txBody>
+      </p:sp>
+      <p:sp>
+        <p:nvSpPr>
+          <p:cNvPr id="3" name="Content Placeholder 2"/>
+          <p:cNvSpPr>
+            <a:spLocks noGrp="1"/>
+          </p:cNvSpPr>
+          <p:nvPr>
+            <p:ph idx="1"/>
+          </p:nvPr>
+        </p:nvSpPr>
+        <p:spPr/>
+        <p:txBody>
+          <a:bodyPr/>
+          <a:lstStyle/>
+          <a:p>
+            <a:r>
+              <a:rPr lang="en-US" dirty="0" smtClean="0"/>
+              <a:t>In some areas, Firefox </a:t>
+            </a:r>
+            <a:r>
+              <a:rPr lang="en-US" dirty="0" smtClean="0"/>
+              <a:t>can be</a:t>
+            </a:r>
+            <a:r>
+              <a:rPr lang="en-US" dirty="0" smtClean="0"/>
+              <a:t> </a:t>
+            </a:r>
+            <a:r>
+              <a:rPr lang="en-US" dirty="0"/>
+              <a:t>difficult to maintain</a:t>
+            </a:r>
+          </a:p>
+          <a:p>
+            <a:pPr lvl="1"/>
+            <a:r>
+              <a:rPr lang="en-US" dirty="0"/>
+              <a:t>A lot of dependencies throughout the browser</a:t>
+            </a:r>
+          </a:p>
+          <a:p>
+            <a:pPr lvl="1"/>
+            <a:r>
+              <a:rPr lang="en-US" dirty="0"/>
+              <a:t>If one API or library breaks, the browser </a:t>
+            </a:r>
+            <a:r>
+              <a:rPr lang="en-US" dirty="0" smtClean="0"/>
+              <a:t>could break</a:t>
+            </a:r>
+            <a:endParaRPr lang="en-US" dirty="0"/>
+          </a:p>
+          <a:p>
+            <a:pPr lvl="1"/>
+            <a:endParaRPr lang="en-US" dirty="0"/>
+          </a:p>
+          <a:p>
+            <a:r>
+              <a:rPr lang="en-US" dirty="0"/>
+              <a:t>Openness can lead to performance issues</a:t>
+            </a:r>
+          </a:p>
+          <a:p>
+            <a:pPr lvl="1"/>
+            <a:r>
+              <a:rPr lang="en-US" dirty="0"/>
+              <a:t>Extensions are easily developed by users and uploaded to the Firefox Store</a:t>
+            </a:r>
+          </a:p>
+          <a:p>
+            <a:pPr lvl="1"/>
+            <a:r>
+              <a:rPr lang="en-US" dirty="0"/>
+              <a:t>Open Nature can lead to user-created extensions bogging down browser performance</a:t>
+            </a:r>
+          </a:p>
+          <a:p>
+            <a:pPr lvl="1"/>
+            <a:endParaRPr lang="en-US" dirty="0"/>
+          </a:p>
+          <a:p>
+            <a:pPr lvl="1"/>
+            <a:endParaRPr lang="en-US" dirty="0"/>
+          </a:p>
+          <a:p>
+            <a:pPr lvl="1"/>
+            <a:endParaRPr lang="en-US" dirty="0"/>
+          </a:p>
+          <a:p>
+            <a:pPr lvl="1"/>
+            <a:endParaRPr lang="en-US" dirty="0"/>
+          </a:p>
+          <a:p>
+            <a:pPr lvl="1"/>
+            <a:endParaRPr lang="en-US" dirty="0"/>
+          </a:p>
+          <a:p>
+            <a:pPr lvl="1"/>
+            <a:endParaRPr lang="en-US" dirty="0"/>
+          </a:p>
+          <a:p>
+            <a:pPr lvl="1"/>
+            <a:endParaRPr lang="en-US" dirty="0"/>
+          </a:p>
+          <a:p>
+            <a:pPr lvl="1"/>
+            <a:endParaRPr lang="en-US" dirty="0"/>
+          </a:p>
+        </p:txBody>
+      </p:sp>
+    </p:spTree>
+    <p:extLst>
+      <p:ext uri="{BB962C8B-B14F-4D97-AF65-F5344CB8AC3E}">
+        <p14:creationId xmlns:p14="http://schemas.microsoft.com/office/powerpoint/2010/main" val="3699235282"/>
+      </p:ext>
+    </p:extLst>
+  </p:cSld>
+  <p:clrMapOvr>
+    <a:masterClrMapping/>
+  </p:clrMapOvr>
+  <p:timing>
+    <p:tnLst>
+      <p:par>
+        <p:cTn id="1" dur="indefinite" restart="never" nodeType="tmRoot"/>
+      </p:par>
+    </p:tnLst>
+  </p:timing>
+</p:sld>
+</file>
+
 <file path=ppt/slides/slide2.xml><?xml version="1.0" encoding="utf-8"?>
 <p:sld xmlns:a="http://schemas.openxmlformats.org/drawingml/2006/main" xmlns:r="http://schemas.openxmlformats.org/officeDocument/2006/relationships" xmlns:p="http://schemas.openxmlformats.org/presentationml/2006/main">
   <p:cSld>
@@ -6055,14 +6229,14 @@
                 <a:gridCol w="2229397">
                   <a:extLst>
                     <a:ext uri="{9D8B030D-6E8A-4147-A177-3AD203B41FA5}">
-                      <a16:colId xmlns:a16="http://schemas.microsoft.com/office/drawing/2014/main" val="3710440082"/>
+                      <a16:colId xmlns:a16="http://schemas.microsoft.com/office/drawing/2014/main" xmlns="" val="3710440082"/>
                     </a:ext>
                   </a:extLst>
                 </a:gridCol>
                 <a:gridCol w="2229397">
                   <a:extLst>
                     <a:ext uri="{9D8B030D-6E8A-4147-A177-3AD203B41FA5}">
-                      <a16:colId xmlns:a16="http://schemas.microsoft.com/office/drawing/2014/main" val="2905397437"/>
+                      <a16:colId xmlns:a16="http://schemas.microsoft.com/office/drawing/2014/main" xmlns="" val="2905397437"/>
                     </a:ext>
                   </a:extLst>
                 </a:gridCol>
@@ -6204,7 +6378,7 @@
                 </a:tc>
                 <a:extLst>
                   <a:ext uri="{0D108BD9-81ED-4DB2-BD59-A6C34878D82A}">
-                    <a16:rowId xmlns:a16="http://schemas.microsoft.com/office/drawing/2014/main" val="2772752005"/>
+                    <a16:rowId xmlns:a16="http://schemas.microsoft.com/office/drawing/2014/main" xmlns="" val="2772752005"/>
                   </a:ext>
                 </a:extLst>
               </a:tr>
@@ -6345,7 +6519,7 @@
                 </a:tc>
                 <a:extLst>
                   <a:ext uri="{0D108BD9-81ED-4DB2-BD59-A6C34878D82A}">
-                    <a16:rowId xmlns:a16="http://schemas.microsoft.com/office/drawing/2014/main" val="1676391367"/>
+                    <a16:rowId xmlns:a16="http://schemas.microsoft.com/office/drawing/2014/main" xmlns="" val="1676391367"/>
                   </a:ext>
                 </a:extLst>
               </a:tr>
@@ -6486,7 +6660,7 @@
                 </a:tc>
                 <a:extLst>
                   <a:ext uri="{0D108BD9-81ED-4DB2-BD59-A6C34878D82A}">
-                    <a16:rowId xmlns:a16="http://schemas.microsoft.com/office/drawing/2014/main" val="3172454865"/>
+                    <a16:rowId xmlns:a16="http://schemas.microsoft.com/office/drawing/2014/main" xmlns="" val="3172454865"/>
                   </a:ext>
                 </a:extLst>
               </a:tr>
@@ -6627,7 +6801,7 @@
                 </a:tc>
                 <a:extLst>
                   <a:ext uri="{0D108BD9-81ED-4DB2-BD59-A6C34878D82A}">
-                    <a16:rowId xmlns:a16="http://schemas.microsoft.com/office/drawing/2014/main" val="234695313"/>
+                    <a16:rowId xmlns:a16="http://schemas.microsoft.com/office/drawing/2014/main" xmlns="" val="234695313"/>
                   </a:ext>
                 </a:extLst>
               </a:tr>
@@ -6768,7 +6942,7 @@
                 </a:tc>
                 <a:extLst>
                   <a:ext uri="{0D108BD9-81ED-4DB2-BD59-A6C34878D82A}">
-                    <a16:rowId xmlns:a16="http://schemas.microsoft.com/office/drawing/2014/main" val="3998947042"/>
+                    <a16:rowId xmlns:a16="http://schemas.microsoft.com/office/drawing/2014/main" xmlns="" val="3998947042"/>
                   </a:ext>
                 </a:extLst>
               </a:tr>
@@ -6909,7 +7083,7 @@
                 </a:tc>
                 <a:extLst>
                   <a:ext uri="{0D108BD9-81ED-4DB2-BD59-A6C34878D82A}">
-                    <a16:rowId xmlns:a16="http://schemas.microsoft.com/office/drawing/2014/main" val="2905133956"/>
+                    <a16:rowId xmlns:a16="http://schemas.microsoft.com/office/drawing/2014/main" xmlns="" val="2905133956"/>
                   </a:ext>
                 </a:extLst>
               </a:tr>
@@ -7050,7 +7224,7 @@
                 </a:tc>
                 <a:extLst>
                   <a:ext uri="{0D108BD9-81ED-4DB2-BD59-A6C34878D82A}">
-                    <a16:rowId xmlns:a16="http://schemas.microsoft.com/office/drawing/2014/main" val="1607767291"/>
+                    <a16:rowId xmlns:a16="http://schemas.microsoft.com/office/drawing/2014/main" xmlns="" val="1607767291"/>
                   </a:ext>
                 </a:extLst>
               </a:tr>
@@ -7191,7 +7365,7 @@
                 </a:tc>
                 <a:extLst>
                   <a:ext uri="{0D108BD9-81ED-4DB2-BD59-A6C34878D82A}">
-                    <a16:rowId xmlns:a16="http://schemas.microsoft.com/office/drawing/2014/main" val="3227625770"/>
+                    <a16:rowId xmlns:a16="http://schemas.microsoft.com/office/drawing/2014/main" xmlns="" val="3227625770"/>
                   </a:ext>
                 </a:extLst>
               </a:tr>
@@ -7332,7 +7506,7 @@
                 </a:tc>
                 <a:extLst>
                   <a:ext uri="{0D108BD9-81ED-4DB2-BD59-A6C34878D82A}">
-                    <a16:rowId xmlns:a16="http://schemas.microsoft.com/office/drawing/2014/main" val="2247873940"/>
+                    <a16:rowId xmlns:a16="http://schemas.microsoft.com/office/drawing/2014/main" xmlns="" val="2247873940"/>
                   </a:ext>
                 </a:extLst>
               </a:tr>
@@ -7473,7 +7647,7 @@
                 </a:tc>
                 <a:extLst>
                   <a:ext uri="{0D108BD9-81ED-4DB2-BD59-A6C34878D82A}">
-                    <a16:rowId xmlns:a16="http://schemas.microsoft.com/office/drawing/2014/main" val="1565331027"/>
+                    <a16:rowId xmlns:a16="http://schemas.microsoft.com/office/drawing/2014/main" xmlns="" val="1565331027"/>
                   </a:ext>
                 </a:extLst>
               </a:tr>
@@ -7556,6 +7730,19 @@
               <a:buNone/>
               <a:tabLst/>
             </a:pPr>
+            <a:r>
+              <a:rPr kumimoji="0" lang="en-US" altLang="en-US" sz="1800" b="0" i="0" u="none" strike="noStrike" cap="none" normalizeH="0" baseline="0">
+                <a:ln>
+                  <a:noFill/>
+                </a:ln>
+                <a:solidFill>
+                  <a:schemeClr val="tx1"/>
+                </a:solidFill>
+                <a:effectLst/>
+                <a:latin typeface="Arial" panose="020B0604020202020204" pitchFamily="34" charset="0"/>
+              </a:rPr>
+              <a:t/>
+            </a:r>
             <a:br>
               <a:rPr kumimoji="0" lang="en-US" altLang="en-US" sz="1800" b="0" i="0" u="none" strike="noStrike" cap="none" normalizeH="0" baseline="0">
                 <a:ln>
@@ -8423,6 +8610,13 @@
   <p:clrMapOvr>
     <a:masterClrMapping/>
   </p:clrMapOvr>
+  <p:timing>
+    <p:tnLst>
+      <p:par>
+        <p:cTn id="1" dur="indefinite" restart="never" nodeType="tmRoot"/>
+      </p:par>
+    </p:tnLst>
+  </p:timing>
 </p:sld>
 </file>
 
@@ -8459,9 +8653,10 @@
           <a:lstStyle/>
           <a:p>
             <a:r>
-              <a:rPr lang="en-US" dirty="0"/>
-              <a:t>Critical Analysis</a:t>
-            </a:r>
+              <a:rPr lang="en-US" dirty="0" smtClean="0"/>
+              <a:t>Critical Analysis -- Benefits</a:t>
+            </a:r>
+            <a:endParaRPr lang="en-US" dirty="0"/>
           </a:p>
         </p:txBody>
       </p:sp>
@@ -8477,78 +8672,86 @@
         </p:nvSpPr>
         <p:spPr/>
         <p:txBody>
-          <a:bodyPr/>
+          <a:bodyPr>
+            <a:normAutofit lnSpcReduction="10000"/>
+          </a:bodyPr>
           <a:lstStyle/>
           <a:p>
             <a:r>
-              <a:rPr lang="en-US" dirty="0"/>
-              <a:t>Firefox is difficult to maintain</a:t>
+              <a:rPr lang="en-US" dirty="0" smtClean="0"/>
+              <a:t>Firefox is Platform Independent </a:t>
             </a:r>
           </a:p>
           <a:p>
             <a:pPr lvl="1"/>
             <a:r>
-              <a:rPr lang="en-US" dirty="0"/>
-              <a:t>A lot of dependencies throughout the browser</a:t>
+              <a:rPr lang="en-US" dirty="0" smtClean="0"/>
+              <a:t>Due to its architecture’s reusable components, Firefox has been ported to and is available on most popular Operating Systems, leading to an often consistent user experience.</a:t>
+            </a:r>
+          </a:p>
+          <a:p>
+            <a:r>
+              <a:rPr lang="en-US" dirty="0" smtClean="0"/>
+              <a:t>Firefox is maintainable</a:t>
             </a:r>
           </a:p>
           <a:p>
             <a:pPr lvl="1"/>
             <a:r>
-              <a:rPr lang="en-US" dirty="0"/>
-              <a:t>If one API or library breaks, the browser breaks</a:t>
+              <a:rPr lang="en-US" dirty="0" smtClean="0"/>
+              <a:t>Layered Architecture</a:t>
             </a:r>
           </a:p>
           <a:p>
             <a:pPr lvl="1"/>
-            <a:endParaRPr lang="en-US" dirty="0"/>
-          </a:p>
-          <a:p>
-            <a:r>
-              <a:rPr lang="en-US" dirty="0"/>
-              <a:t>Openness can lead to performance issues</a:t>
+            <a:r>
+              <a:rPr lang="en-US" dirty="0">
+                <a:sym typeface="Wingdings"/>
+              </a:rPr>
+              <a:t>C</a:t>
+            </a:r>
+            <a:r>
+              <a:rPr lang="en-US" dirty="0" smtClean="0">
+                <a:sym typeface="Wingdings"/>
+              </a:rPr>
+              <a:t>omponents are restricted to only communicate with certain layers. Changes don’t usually affect the entire code base.</a:t>
+            </a:r>
+            <a:endParaRPr lang="en-US" dirty="0" smtClean="0"/>
+          </a:p>
+          <a:p>
+            <a:r>
+              <a:rPr lang="en-US" dirty="0" smtClean="0"/>
+              <a:t>Firefox is extensible</a:t>
             </a:r>
           </a:p>
           <a:p>
             <a:pPr lvl="1"/>
             <a:r>
-              <a:rPr lang="en-US" dirty="0"/>
-              <a:t>Extensions are easily developed by users and uploaded to the Firefox Store</a:t>
+              <a:rPr lang="en-US" dirty="0" smtClean="0"/>
+              <a:t>Many extensions are available</a:t>
             </a:r>
           </a:p>
           <a:p>
             <a:pPr lvl="1"/>
             <a:r>
-              <a:rPr lang="en-US" dirty="0"/>
-              <a:t>Open Nature can lead to user-created extensions bogging down browser performance</a:t>
+              <a:rPr lang="en-US" dirty="0" smtClean="0"/>
+              <a:t>Extensions are independently built </a:t>
+            </a:r>
+            <a:r>
+              <a:rPr lang="mr-IN" dirty="0" smtClean="0"/>
+              <a:t>–</a:t>
+            </a:r>
+            <a:r>
+              <a:rPr lang="en-US" dirty="0" smtClean="0"/>
+              <a:t> can be easily installed and removed</a:t>
             </a:r>
           </a:p>
           <a:p>
             <a:pPr lvl="1"/>
-            <a:endParaRPr lang="en-US" dirty="0"/>
-          </a:p>
-          <a:p>
-            <a:pPr lvl="1"/>
-            <a:endParaRPr lang="en-US" dirty="0"/>
-          </a:p>
-          <a:p>
-            <a:pPr lvl="1"/>
-            <a:endParaRPr lang="en-US" dirty="0"/>
-          </a:p>
-          <a:p>
-            <a:pPr lvl="1"/>
-            <a:endParaRPr lang="en-US" dirty="0"/>
-          </a:p>
-          <a:p>
-            <a:pPr lvl="1"/>
-            <a:endParaRPr lang="en-US" dirty="0"/>
-          </a:p>
-          <a:p>
-            <a:pPr lvl="1"/>
-            <a:endParaRPr lang="en-US" dirty="0"/>
-          </a:p>
-          <a:p>
-            <a:pPr lvl="1"/>
+            <a:r>
+              <a:rPr lang="en-US" dirty="0" smtClean="0"/>
+              <a:t>Extensions can add a lot of interesting functionality not initially available</a:t>
+            </a:r>
             <a:endParaRPr lang="en-US" dirty="0"/>
           </a:p>
           <a:p>
@@ -8560,13 +8763,20 @@
     </p:spTree>
     <p:extLst>
       <p:ext uri="{BB962C8B-B14F-4D97-AF65-F5344CB8AC3E}">
-        <p14:creationId xmlns:p14="http://schemas.microsoft.com/office/powerpoint/2010/main" val="3699235282"/>
+        <p14:creationId xmlns:p14="http://schemas.microsoft.com/office/powerpoint/2010/main" val="843597851"/>
       </p:ext>
     </p:extLst>
   </p:cSld>
   <p:clrMapOvr>
     <a:masterClrMapping/>
   </p:clrMapOvr>
+  <p:timing>
+    <p:tnLst>
+      <p:par>
+        <p:cTn id="1" dur="indefinite" restart="never" nodeType="tmRoot"/>
+      </p:par>
+    </p:tnLst>
+  </p:timing>
 </p:sld>
 </file>
 

</xml_diff>

<commit_message>
Moved discovery process to start in presentation
</commit_message>
<xml_diff>
--- a/Mozilla Firefox.pptx
+++ b/Mozilla Firefox.pptx
@@ -7,12 +7,12 @@
   <p:sldIdLst>
     <p:sldId id="256" r:id="rId2"/>
     <p:sldId id="257" r:id="rId3"/>
-    <p:sldId id="261" r:id="rId4"/>
-    <p:sldId id="258" r:id="rId5"/>
-    <p:sldId id="259" r:id="rId6"/>
-    <p:sldId id="260" r:id="rId7"/>
-    <p:sldId id="262" r:id="rId8"/>
-    <p:sldId id="264" r:id="rId9"/>
+    <p:sldId id="264" r:id="rId4"/>
+    <p:sldId id="261" r:id="rId5"/>
+    <p:sldId id="258" r:id="rId6"/>
+    <p:sldId id="259" r:id="rId7"/>
+    <p:sldId id="260" r:id="rId8"/>
+    <p:sldId id="262" r:id="rId9"/>
     <p:sldId id="265" r:id="rId10"/>
     <p:sldId id="263" r:id="rId11"/>
   </p:sldIdLst>
@@ -867,7 +867,7 @@
             <a:fld id="{B61BEF0D-F0BB-DE4B-95CE-6DB70DBA9567}" type="datetimeFigureOut">
               <a:rPr lang="en-US" dirty="0"/>
               <a:pPr/>
-              <a:t>11/29/16</a:t>
+              <a:t>11/29/2016</a:t>
             </a:fld>
             <a:endParaRPr lang="en-US" dirty="0"/>
           </a:p>
@@ -1115,7 +1115,7 @@
             <a:fld id="{B61BEF0D-F0BB-DE4B-95CE-6DB70DBA9567}" type="datetimeFigureOut">
               <a:rPr lang="en-US" dirty="0"/>
               <a:pPr/>
-              <a:t>11/29/16</a:t>
+              <a:t>11/29/2016</a:t>
             </a:fld>
             <a:endParaRPr lang="en-US" dirty="0"/>
           </a:p>
@@ -1426,7 +1426,7 @@
             <a:fld id="{B61BEF0D-F0BB-DE4B-95CE-6DB70DBA9567}" type="datetimeFigureOut">
               <a:rPr lang="en-US" dirty="0"/>
               <a:pPr/>
-              <a:t>11/29/16</a:t>
+              <a:t>11/29/2016</a:t>
             </a:fld>
             <a:endParaRPr lang="en-US" dirty="0"/>
           </a:p>
@@ -1756,7 +1756,7 @@
             <a:fld id="{B61BEF0D-F0BB-DE4B-95CE-6DB70DBA9567}" type="datetimeFigureOut">
               <a:rPr lang="en-US" dirty="0"/>
               <a:pPr/>
-              <a:t>11/29/16</a:t>
+              <a:t>11/29/2016</a:t>
             </a:fld>
             <a:endParaRPr lang="en-US" dirty="0"/>
           </a:p>
@@ -2067,7 +2067,7 @@
             <a:fld id="{B61BEF0D-F0BB-DE4B-95CE-6DB70DBA9567}" type="datetimeFigureOut">
               <a:rPr lang="en-US" dirty="0"/>
               <a:pPr/>
-              <a:t>11/29/16</a:t>
+              <a:t>11/29/2016</a:t>
             </a:fld>
             <a:endParaRPr lang="en-US" dirty="0"/>
           </a:p>
@@ -2457,7 +2457,7 @@
             <a:fld id="{B61BEF0D-F0BB-DE4B-95CE-6DB70DBA9567}" type="datetimeFigureOut">
               <a:rPr lang="en-US" dirty="0"/>
               <a:pPr/>
-              <a:t>11/29/16</a:t>
+              <a:t>11/29/2016</a:t>
             </a:fld>
             <a:endParaRPr lang="en-US" dirty="0"/>
           </a:p>
@@ -2623,7 +2623,7 @@
           <a:p>
             <a:fld id="{55C6B4A9-1611-4792-9094-5F34BCA07E0B}" type="datetimeFigureOut">
               <a:rPr lang="en-US" dirty="0"/>
-              <a:t>11/29/16</a:t>
+              <a:t>11/29/2016</a:t>
             </a:fld>
             <a:endParaRPr lang="en-US" dirty="0"/>
           </a:p>
@@ -2799,7 +2799,7 @@
             <a:fld id="{B61BEF0D-F0BB-DE4B-95CE-6DB70DBA9567}" type="datetimeFigureOut">
               <a:rPr lang="en-US" dirty="0"/>
               <a:pPr/>
-              <a:t>11/29/16</a:t>
+              <a:t>11/29/2016</a:t>
             </a:fld>
             <a:endParaRPr lang="en-US" dirty="0"/>
           </a:p>
@@ -2965,7 +2965,7 @@
           <a:p>
             <a:fld id="{42A54C80-263E-416B-A8E0-580EDEADCBDC}" type="datetimeFigureOut">
               <a:rPr lang="en-US" dirty="0"/>
-              <a:t>11/29/16</a:t>
+              <a:t>11/29/2016</a:t>
             </a:fld>
             <a:endParaRPr lang="en-US" dirty="0"/>
           </a:p>
@@ -3208,7 +3208,7 @@
             <a:fld id="{B61BEF0D-F0BB-DE4B-95CE-6DB70DBA9567}" type="datetimeFigureOut">
               <a:rPr lang="en-US" dirty="0"/>
               <a:pPr/>
-              <a:t>11/29/16</a:t>
+              <a:t>11/29/2016</a:t>
             </a:fld>
             <a:endParaRPr lang="en-US" dirty="0"/>
           </a:p>
@@ -3436,7 +3436,7 @@
           <a:p>
             <a:fld id="{42A54C80-263E-416B-A8E0-580EDEADCBDC}" type="datetimeFigureOut">
               <a:rPr lang="en-US" dirty="0"/>
-              <a:t>11/29/16</a:t>
+              <a:t>11/29/2016</a:t>
             </a:fld>
             <a:endParaRPr lang="en-US" dirty="0"/>
           </a:p>
@@ -3806,7 +3806,7 @@
             <a:fld id="{B61BEF0D-F0BB-DE4B-95CE-6DB70DBA9567}" type="datetimeFigureOut">
               <a:rPr lang="en-US" dirty="0"/>
               <a:pPr/>
-              <a:t>11/29/16</a:t>
+              <a:t>11/29/2016</a:t>
             </a:fld>
             <a:endParaRPr lang="en-US" dirty="0"/>
           </a:p>
@@ -3926,7 +3926,7 @@
             <a:fld id="{B61BEF0D-F0BB-DE4B-95CE-6DB70DBA9567}" type="datetimeFigureOut">
               <a:rPr lang="en-US" dirty="0"/>
               <a:pPr/>
-              <a:t>11/29/16</a:t>
+              <a:t>11/29/2016</a:t>
             </a:fld>
             <a:endParaRPr lang="en-US" dirty="0"/>
           </a:p>
@@ -4018,7 +4018,7 @@
             <a:fld id="{B61BEF0D-F0BB-DE4B-95CE-6DB70DBA9567}" type="datetimeFigureOut">
               <a:rPr lang="en-US" dirty="0"/>
               <a:pPr/>
-              <a:t>11/29/16</a:t>
+              <a:t>11/29/2016</a:t>
             </a:fld>
             <a:endParaRPr lang="en-US" dirty="0"/>
           </a:p>
@@ -4269,7 +4269,7 @@
           <a:p>
             <a:fld id="{42A54C80-263E-416B-A8E0-580EDEADCBDC}" type="datetimeFigureOut">
               <a:rPr lang="en-US" dirty="0"/>
-              <a:t>11/29/16</a:t>
+              <a:t>11/29/2016</a:t>
             </a:fld>
             <a:endParaRPr lang="en-US" dirty="0"/>
           </a:p>
@@ -4571,7 +4571,7 @@
             <a:fld id="{B61BEF0D-F0BB-DE4B-95CE-6DB70DBA9567}" type="datetimeFigureOut">
               <a:rPr lang="en-US" dirty="0"/>
               <a:pPr/>
-              <a:t>11/29/16</a:t>
+              <a:t>11/29/2016</a:t>
             </a:fld>
             <a:endParaRPr lang="en-US" dirty="0"/>
           </a:p>
@@ -5269,7 +5269,7 @@
             <a:fld id="{B61BEF0D-F0BB-DE4B-95CE-6DB70DBA9567}" type="datetimeFigureOut">
               <a:rPr lang="en-US" dirty="0"/>
               <a:pPr/>
-              <a:t>11/29/16</a:t>
+              <a:t>11/29/2016</a:t>
             </a:fld>
             <a:endParaRPr lang="en-US" dirty="0"/>
           </a:p>
@@ -5926,13 +5926,8 @@
           <a:p>
             <a:r>
               <a:rPr lang="en-US" dirty="0"/>
-              <a:t>Critical </a:t>
-            </a:r>
-            <a:r>
-              <a:rPr lang="en-US" dirty="0" smtClean="0"/>
-              <a:t>Analysis -- Drawbacks</a:t>
-            </a:r>
-            <a:endParaRPr lang="en-US" dirty="0"/>
+              <a:t>Critical Analysis -- Drawbacks</a:t>
+            </a:r>
           </a:p>
         </p:txBody>
       </p:sp>
@@ -5952,20 +5947,8 @@
           <a:lstStyle/>
           <a:p>
             <a:r>
-              <a:rPr lang="en-US" dirty="0" smtClean="0"/>
-              <a:t>In some areas, Firefox </a:t>
-            </a:r>
-            <a:r>
-              <a:rPr lang="en-US" dirty="0" smtClean="0"/>
-              <a:t>can be</a:t>
-            </a:r>
-            <a:r>
-              <a:rPr lang="en-US" dirty="0" smtClean="0"/>
-              <a:t> </a:t>
-            </a:r>
-            <a:r>
               <a:rPr lang="en-US" dirty="0"/>
-              <a:t>difficult to maintain</a:t>
+              <a:t>In some areas, Firefox can be difficult to maintain</a:t>
             </a:r>
           </a:p>
           <a:p>
@@ -5979,13 +5962,8 @@
             <a:pPr lvl="1"/>
             <a:r>
               <a:rPr lang="en-US" dirty="0"/>
-              <a:t>If one API or library breaks, the browser </a:t>
-            </a:r>
-            <a:r>
-              <a:rPr lang="en-US" dirty="0" smtClean="0"/>
-              <a:t>could break</a:t>
-            </a:r>
-            <a:endParaRPr lang="en-US" dirty="0"/>
+              <a:t>If one API or library breaks, the browser could break</a:t>
+            </a:r>
           </a:p>
           <a:p>
             <a:pPr lvl="1"/>
@@ -6055,13 +6033,6 @@
   <p:clrMapOvr>
     <a:masterClrMapping/>
   </p:clrMapOvr>
-  <p:timing>
-    <p:tnLst>
-      <p:par>
-        <p:cTn id="1" dur="indefinite" restart="never" nodeType="tmRoot"/>
-      </p:par>
-    </p:tnLst>
-  </p:timing>
 </p:sld>
 </file>
 
@@ -6202,6 +6173,125 @@
           <a:p>
             <a:r>
               <a:rPr lang="en-US" dirty="0"/>
+              <a:t>Discovery Process</a:t>
+            </a:r>
+          </a:p>
+        </p:txBody>
+      </p:sp>
+      <p:sp>
+        <p:nvSpPr>
+          <p:cNvPr id="3" name="Content Placeholder 2"/>
+          <p:cNvSpPr>
+            <a:spLocks noGrp="1"/>
+          </p:cNvSpPr>
+          <p:nvPr>
+            <p:ph idx="1"/>
+          </p:nvPr>
+        </p:nvSpPr>
+        <p:spPr/>
+        <p:txBody>
+          <a:bodyPr/>
+          <a:lstStyle/>
+          <a:p>
+            <a:r>
+              <a:rPr lang="en-US" dirty="0"/>
+              <a:t>Open Source Browser </a:t>
+            </a:r>
+            <a:r>
+              <a:rPr lang="en-US" dirty="0">
+                <a:sym typeface="Wingdings" panose="05000000000000000000" pitchFamily="2" charset="2"/>
+              </a:rPr>
+              <a:t> Documentation was very extensive and helpful</a:t>
+            </a:r>
+          </a:p>
+          <a:p>
+            <a:r>
+              <a:rPr lang="en-US" dirty="0">
+                <a:sym typeface="Wingdings" panose="05000000000000000000" pitchFamily="2" charset="2"/>
+              </a:rPr>
+              <a:t>Wrote Scripts using </a:t>
+            </a:r>
+            <a:r>
+              <a:rPr lang="en-US" dirty="0" err="1">
+                <a:sym typeface="Wingdings" panose="05000000000000000000" pitchFamily="2" charset="2"/>
+              </a:rPr>
+              <a:t>Powershell</a:t>
+            </a:r>
+            <a:r>
+              <a:rPr lang="en-US" dirty="0">
+                <a:sym typeface="Wingdings" panose="05000000000000000000" pitchFamily="2" charset="2"/>
+              </a:rPr>
+              <a:t> to analyze code-base</a:t>
+            </a:r>
+          </a:p>
+          <a:p>
+            <a:r>
+              <a:rPr lang="en-US" dirty="0">
+                <a:sym typeface="Wingdings" panose="05000000000000000000" pitchFamily="2" charset="2"/>
+              </a:rPr>
+              <a:t>Detailed Documentation by Mozilla helped us figure out what API’s Firefox used</a:t>
+            </a:r>
+          </a:p>
+          <a:p>
+            <a:pPr marL="0" indent="0">
+              <a:buNone/>
+            </a:pPr>
+            <a:endParaRPr lang="en-US" dirty="0">
+              <a:sym typeface="Wingdings" panose="05000000000000000000" pitchFamily="2" charset="2"/>
+            </a:endParaRPr>
+          </a:p>
+          <a:p>
+            <a:endParaRPr lang="en-US" dirty="0"/>
+          </a:p>
+        </p:txBody>
+      </p:sp>
+    </p:spTree>
+    <p:extLst>
+      <p:ext uri="{BB962C8B-B14F-4D97-AF65-F5344CB8AC3E}">
+        <p14:creationId xmlns:p14="http://schemas.microsoft.com/office/powerpoint/2010/main" val="1615861478"/>
+      </p:ext>
+    </p:extLst>
+  </p:cSld>
+  <p:clrMapOvr>
+    <a:masterClrMapping/>
+  </p:clrMapOvr>
+</p:sld>
+</file>
+
+<file path=ppt/slides/slide4.xml><?xml version="1.0" encoding="utf-8"?>
+<p:sld xmlns:a="http://schemas.openxmlformats.org/drawingml/2006/main" xmlns:r="http://schemas.openxmlformats.org/officeDocument/2006/relationships" xmlns:p="http://schemas.openxmlformats.org/presentationml/2006/main">
+  <p:cSld>
+    <p:spTree>
+      <p:nvGrpSpPr>
+        <p:cNvPr id="1" name=""/>
+        <p:cNvGrpSpPr/>
+        <p:nvPr/>
+      </p:nvGrpSpPr>
+      <p:grpSpPr>
+        <a:xfrm>
+          <a:off x="0" y="0"/>
+          <a:ext cx="0" cy="0"/>
+          <a:chOff x="0" y="0"/>
+          <a:chExt cx="0" cy="0"/>
+        </a:xfrm>
+      </p:grpSpPr>
+      <p:sp>
+        <p:nvSpPr>
+          <p:cNvPr id="2" name="Title 1"/>
+          <p:cNvSpPr>
+            <a:spLocks noGrp="1"/>
+          </p:cNvSpPr>
+          <p:nvPr>
+            <p:ph type="title"/>
+          </p:nvPr>
+        </p:nvSpPr>
+        <p:spPr/>
+        <p:txBody>
+          <a:bodyPr/>
+          <a:lstStyle/>
+          <a:p>
+            <a:r>
+              <a:rPr lang="en-US" dirty="0"/>
               <a:t>Metrics</a:t>
             </a:r>
           </a:p>
@@ -6229,14 +6319,14 @@
                 <a:gridCol w="2229397">
                   <a:extLst>
                     <a:ext uri="{9D8B030D-6E8A-4147-A177-3AD203B41FA5}">
-                      <a16:colId xmlns:a16="http://schemas.microsoft.com/office/drawing/2014/main" xmlns="" val="3710440082"/>
+                      <a16:colId xmlns:a16="http://schemas.microsoft.com/office/drawing/2014/main" val="3710440082"/>
                     </a:ext>
                   </a:extLst>
                 </a:gridCol>
                 <a:gridCol w="2229397">
                   <a:extLst>
                     <a:ext uri="{9D8B030D-6E8A-4147-A177-3AD203B41FA5}">
-                      <a16:colId xmlns:a16="http://schemas.microsoft.com/office/drawing/2014/main" xmlns="" val="2905397437"/>
+                      <a16:colId xmlns:a16="http://schemas.microsoft.com/office/drawing/2014/main" val="2905397437"/>
                     </a:ext>
                   </a:extLst>
                 </a:gridCol>
@@ -6378,7 +6468,7 @@
                 </a:tc>
                 <a:extLst>
                   <a:ext uri="{0D108BD9-81ED-4DB2-BD59-A6C34878D82A}">
-                    <a16:rowId xmlns:a16="http://schemas.microsoft.com/office/drawing/2014/main" xmlns="" val="2772752005"/>
+                    <a16:rowId xmlns:a16="http://schemas.microsoft.com/office/drawing/2014/main" val="2772752005"/>
                   </a:ext>
                 </a:extLst>
               </a:tr>
@@ -6519,7 +6609,7 @@
                 </a:tc>
                 <a:extLst>
                   <a:ext uri="{0D108BD9-81ED-4DB2-BD59-A6C34878D82A}">
-                    <a16:rowId xmlns:a16="http://schemas.microsoft.com/office/drawing/2014/main" xmlns="" val="1676391367"/>
+                    <a16:rowId xmlns:a16="http://schemas.microsoft.com/office/drawing/2014/main" val="1676391367"/>
                   </a:ext>
                 </a:extLst>
               </a:tr>
@@ -6660,7 +6750,7 @@
                 </a:tc>
                 <a:extLst>
                   <a:ext uri="{0D108BD9-81ED-4DB2-BD59-A6C34878D82A}">
-                    <a16:rowId xmlns:a16="http://schemas.microsoft.com/office/drawing/2014/main" xmlns="" val="3172454865"/>
+                    <a16:rowId xmlns:a16="http://schemas.microsoft.com/office/drawing/2014/main" val="3172454865"/>
                   </a:ext>
                 </a:extLst>
               </a:tr>
@@ -6801,7 +6891,7 @@
                 </a:tc>
                 <a:extLst>
                   <a:ext uri="{0D108BD9-81ED-4DB2-BD59-A6C34878D82A}">
-                    <a16:rowId xmlns:a16="http://schemas.microsoft.com/office/drawing/2014/main" xmlns="" val="234695313"/>
+                    <a16:rowId xmlns:a16="http://schemas.microsoft.com/office/drawing/2014/main" val="234695313"/>
                   </a:ext>
                 </a:extLst>
               </a:tr>
@@ -6942,7 +7032,7 @@
                 </a:tc>
                 <a:extLst>
                   <a:ext uri="{0D108BD9-81ED-4DB2-BD59-A6C34878D82A}">
-                    <a16:rowId xmlns:a16="http://schemas.microsoft.com/office/drawing/2014/main" xmlns="" val="3998947042"/>
+                    <a16:rowId xmlns:a16="http://schemas.microsoft.com/office/drawing/2014/main" val="3998947042"/>
                   </a:ext>
                 </a:extLst>
               </a:tr>
@@ -7083,7 +7173,7 @@
                 </a:tc>
                 <a:extLst>
                   <a:ext uri="{0D108BD9-81ED-4DB2-BD59-A6C34878D82A}">
-                    <a16:rowId xmlns:a16="http://schemas.microsoft.com/office/drawing/2014/main" xmlns="" val="2905133956"/>
+                    <a16:rowId xmlns:a16="http://schemas.microsoft.com/office/drawing/2014/main" val="2905133956"/>
                   </a:ext>
                 </a:extLst>
               </a:tr>
@@ -7224,7 +7314,7 @@
                 </a:tc>
                 <a:extLst>
                   <a:ext uri="{0D108BD9-81ED-4DB2-BD59-A6C34878D82A}">
-                    <a16:rowId xmlns:a16="http://schemas.microsoft.com/office/drawing/2014/main" xmlns="" val="1607767291"/>
+                    <a16:rowId xmlns:a16="http://schemas.microsoft.com/office/drawing/2014/main" val="1607767291"/>
                   </a:ext>
                 </a:extLst>
               </a:tr>
@@ -7365,7 +7455,7 @@
                 </a:tc>
                 <a:extLst>
                   <a:ext uri="{0D108BD9-81ED-4DB2-BD59-A6C34878D82A}">
-                    <a16:rowId xmlns:a16="http://schemas.microsoft.com/office/drawing/2014/main" xmlns="" val="3227625770"/>
+                    <a16:rowId xmlns:a16="http://schemas.microsoft.com/office/drawing/2014/main" val="3227625770"/>
                   </a:ext>
                 </a:extLst>
               </a:tr>
@@ -7506,7 +7596,7 @@
                 </a:tc>
                 <a:extLst>
                   <a:ext uri="{0D108BD9-81ED-4DB2-BD59-A6C34878D82A}">
-                    <a16:rowId xmlns:a16="http://schemas.microsoft.com/office/drawing/2014/main" xmlns="" val="2247873940"/>
+                    <a16:rowId xmlns:a16="http://schemas.microsoft.com/office/drawing/2014/main" val="2247873940"/>
                   </a:ext>
                 </a:extLst>
               </a:tr>
@@ -7647,7 +7737,7 @@
                 </a:tc>
                 <a:extLst>
                   <a:ext uri="{0D108BD9-81ED-4DB2-BD59-A6C34878D82A}">
-                    <a16:rowId xmlns:a16="http://schemas.microsoft.com/office/drawing/2014/main" xmlns="" val="1565331027"/>
+                    <a16:rowId xmlns:a16="http://schemas.microsoft.com/office/drawing/2014/main" val="1565331027"/>
                   </a:ext>
                 </a:extLst>
               </a:tr>
@@ -7730,19 +7820,6 @@
               <a:buNone/>
               <a:tabLst/>
             </a:pPr>
-            <a:r>
-              <a:rPr kumimoji="0" lang="en-US" altLang="en-US" sz="1800" b="0" i="0" u="none" strike="noStrike" cap="none" normalizeH="0" baseline="0">
-                <a:ln>
-                  <a:noFill/>
-                </a:ln>
-                <a:solidFill>
-                  <a:schemeClr val="tx1"/>
-                </a:solidFill>
-                <a:effectLst/>
-                <a:latin typeface="Arial" panose="020B0604020202020204" pitchFamily="34" charset="0"/>
-              </a:rPr>
-              <a:t/>
-            </a:r>
             <a:br>
               <a:rPr kumimoji="0" lang="en-US" altLang="en-US" sz="1800" b="0" i="0" u="none" strike="noStrike" cap="none" normalizeH="0" baseline="0">
                 <a:ln>
@@ -7809,7 +7886,7 @@
 </p:sld>
 </file>
 
-<file path=ppt/slides/slide4.xml><?xml version="1.0" encoding="utf-8"?>
+<file path=ppt/slides/slide5.xml><?xml version="1.0" encoding="utf-8"?>
 <p:sld xmlns:a="http://schemas.openxmlformats.org/drawingml/2006/main" xmlns:r="http://schemas.openxmlformats.org/officeDocument/2006/relationships" xmlns:p="http://schemas.openxmlformats.org/presentationml/2006/main">
   <p:cSld>
     <p:spTree>
@@ -7965,7 +8042,7 @@
 </p:sld>
 </file>
 
-<file path=ppt/slides/slide5.xml><?xml version="1.0" encoding="utf-8"?>
+<file path=ppt/slides/slide6.xml><?xml version="1.0" encoding="utf-8"?>
 <p:sld xmlns:a="http://schemas.openxmlformats.org/drawingml/2006/main" xmlns:r="http://schemas.openxmlformats.org/officeDocument/2006/relationships" xmlns:p="http://schemas.openxmlformats.org/presentationml/2006/main">
   <p:cSld>
     <p:spTree>
@@ -8129,7 +8206,7 @@
 </p:sld>
 </file>
 
-<file path=ppt/slides/slide6.xml><?xml version="1.0" encoding="utf-8"?>
+<file path=ppt/slides/slide7.xml><?xml version="1.0" encoding="utf-8"?>
 <p:sld xmlns:a="http://schemas.openxmlformats.org/drawingml/2006/main" xmlns:r="http://schemas.openxmlformats.org/officeDocument/2006/relationships" xmlns:p="http://schemas.openxmlformats.org/presentationml/2006/main">
   <p:cSld>
     <p:spTree>
@@ -8350,150 +8427,6 @@
 </p:sld>
 </file>
 
-<file path=ppt/slides/slide7.xml><?xml version="1.0" encoding="utf-8"?>
-<p:sld xmlns:a="http://schemas.openxmlformats.org/drawingml/2006/main" xmlns:r="http://schemas.openxmlformats.org/officeDocument/2006/relationships" xmlns:p="http://schemas.openxmlformats.org/presentationml/2006/main">
-  <p:cSld>
-    <p:spTree>
-      <p:nvGrpSpPr>
-        <p:cNvPr id="1" name=""/>
-        <p:cNvGrpSpPr/>
-        <p:nvPr/>
-      </p:nvGrpSpPr>
-      <p:grpSpPr>
-        <a:xfrm>
-          <a:off x="0" y="0"/>
-          <a:ext cx="0" cy="0"/>
-          <a:chOff x="0" y="0"/>
-          <a:chExt cx="0" cy="0"/>
-        </a:xfrm>
-      </p:grpSpPr>
-      <p:sp>
-        <p:nvSpPr>
-          <p:cNvPr id="2" name="Title 1"/>
-          <p:cNvSpPr>
-            <a:spLocks noGrp="1"/>
-          </p:cNvSpPr>
-          <p:nvPr>
-            <p:ph type="title"/>
-          </p:nvPr>
-        </p:nvSpPr>
-        <p:spPr/>
-        <p:txBody>
-          <a:bodyPr/>
-          <a:lstStyle/>
-          <a:p>
-            <a:r>
-              <a:rPr lang="en-US" dirty="0"/>
-              <a:t>Design Patterns</a:t>
-            </a:r>
-          </a:p>
-        </p:txBody>
-      </p:sp>
-      <p:sp>
-        <p:nvSpPr>
-          <p:cNvPr id="3" name="Content Placeholder 2"/>
-          <p:cNvSpPr>
-            <a:spLocks noGrp="1"/>
-          </p:cNvSpPr>
-          <p:nvPr>
-            <p:ph idx="1"/>
-          </p:nvPr>
-        </p:nvSpPr>
-        <p:spPr/>
-        <p:txBody>
-          <a:bodyPr/>
-          <a:lstStyle/>
-          <a:p>
-            <a:r>
-              <a:rPr lang="en-US" dirty="0"/>
-              <a:t>Singleton</a:t>
-            </a:r>
-          </a:p>
-          <a:p>
-            <a:pPr lvl="1"/>
-            <a:r>
-              <a:rPr lang="en-US" dirty="0"/>
-              <a:t>Several examples, including </a:t>
-            </a:r>
-            <a:r>
-              <a:rPr lang="en-US" dirty="0" err="1"/>
-              <a:t>CookieService</a:t>
-            </a:r>
-            <a:r>
-              <a:rPr lang="en-US" dirty="0"/>
-              <a:t> (static class in </a:t>
-            </a:r>
-            <a:r>
-              <a:rPr lang="en-US" dirty="0" err="1"/>
-              <a:t>Necko</a:t>
-            </a:r>
-            <a:r>
-              <a:rPr lang="en-US" dirty="0"/>
-              <a:t>)</a:t>
-            </a:r>
-          </a:p>
-          <a:p>
-            <a:r>
-              <a:rPr lang="en-US" dirty="0"/>
-              <a:t>Proxy</a:t>
-            </a:r>
-          </a:p>
-          <a:p>
-            <a:pPr lvl="1"/>
-            <a:r>
-              <a:rPr lang="en-US" dirty="0"/>
-              <a:t>Several classes accessed via proxy, including </a:t>
-            </a:r>
-            <a:r>
-              <a:rPr lang="en-US" dirty="0" err="1"/>
-              <a:t>nsCORSListenerProxy</a:t>
-            </a:r>
-            <a:endParaRPr lang="en-US" dirty="0"/>
-          </a:p>
-          <a:p>
-            <a:pPr lvl="1"/>
-            <a:r>
-              <a:rPr lang="en-US" dirty="0"/>
-              <a:t>Good for simplifying data access and security</a:t>
-            </a:r>
-          </a:p>
-          <a:p>
-            <a:r>
-              <a:rPr lang="en-US" dirty="0"/>
-              <a:t>Factory</a:t>
-            </a:r>
-          </a:p>
-          <a:p>
-            <a:pPr lvl="1"/>
-            <a:r>
-              <a:rPr lang="en-US" dirty="0" err="1"/>
-              <a:t>nsWidgetFactory</a:t>
-            </a:r>
-            <a:r>
-              <a:rPr lang="en-US" dirty="0"/>
-              <a:t>, but even more </a:t>
-            </a:r>
-            <a:r>
-              <a:rPr lang="en-US"/>
-              <a:t>generic with macros</a:t>
-            </a:r>
-            <a:endParaRPr lang="en-US" dirty="0"/>
-          </a:p>
-        </p:txBody>
-      </p:sp>
-    </p:spTree>
-    <p:extLst>
-      <p:ext uri="{BB962C8B-B14F-4D97-AF65-F5344CB8AC3E}">
-        <p14:creationId xmlns:p14="http://schemas.microsoft.com/office/powerpoint/2010/main" val="187624009"/>
-      </p:ext>
-    </p:extLst>
-  </p:cSld>
-  <p:clrMapOvr>
-    <a:masterClrMapping/>
-  </p:clrMapOvr>
-</p:sld>
-</file>
-
 <file path=ppt/slides/slide8.xml><?xml version="1.0" encoding="utf-8"?>
 <p:sld xmlns:a="http://schemas.openxmlformats.org/drawingml/2006/main" xmlns:r="http://schemas.openxmlformats.org/officeDocument/2006/relationships" xmlns:p="http://schemas.openxmlformats.org/presentationml/2006/main">
   <p:cSld>
@@ -8528,7 +8461,7 @@
           <a:p>
             <a:r>
               <a:rPr lang="en-US" dirty="0"/>
-              <a:t>Discovery Process</a:t>
+              <a:t>Design Patterns</a:t>
             </a:r>
           </a:p>
         </p:txBody>
@@ -8550,52 +8483,77 @@
           <a:p>
             <a:r>
               <a:rPr lang="en-US" dirty="0"/>
-              <a:t>Open Source Browser </a:t>
-            </a:r>
-            <a:r>
-              <a:rPr lang="en-US" dirty="0">
-                <a:sym typeface="Wingdings" panose="05000000000000000000" pitchFamily="2" charset="2"/>
-              </a:rPr>
-              <a:t> Documentation was very extensive and helpful</a:t>
-            </a:r>
-          </a:p>
-          <a:p>
-            <a:r>
-              <a:rPr lang="en-US" dirty="0">
-                <a:sym typeface="Wingdings" panose="05000000000000000000" pitchFamily="2" charset="2"/>
-              </a:rPr>
-              <a:t>Wrote Scripts using </a:t>
-            </a:r>
-            <a:r>
-              <a:rPr lang="en-US" dirty="0" err="1">
-                <a:sym typeface="Wingdings" panose="05000000000000000000" pitchFamily="2" charset="2"/>
-              </a:rPr>
-              <a:t>Powershell</a:t>
-            </a:r>
-            <a:r>
-              <a:rPr lang="en-US" dirty="0">
-                <a:sym typeface="Wingdings" panose="05000000000000000000" pitchFamily="2" charset="2"/>
-              </a:rPr>
-              <a:t> to analyze code-base</a:t>
-            </a:r>
-          </a:p>
-          <a:p>
-            <a:r>
-              <a:rPr lang="en-US" dirty="0">
-                <a:sym typeface="Wingdings" panose="05000000000000000000" pitchFamily="2" charset="2"/>
-              </a:rPr>
-              <a:t>Detailed Documentation by Mozilla helped us figure out what API’s Firefox used</a:t>
-            </a:r>
-          </a:p>
-          <a:p>
-            <a:pPr marL="0" indent="0">
-              <a:buNone/>
-            </a:pPr>
-            <a:endParaRPr lang="en-US" dirty="0">
-              <a:sym typeface="Wingdings" panose="05000000000000000000" pitchFamily="2" charset="2"/>
-            </a:endParaRPr>
-          </a:p>
-          <a:p>
+              <a:t>Singleton</a:t>
+            </a:r>
+          </a:p>
+          <a:p>
+            <a:pPr lvl="1"/>
+            <a:r>
+              <a:rPr lang="en-US" dirty="0"/>
+              <a:t>Several examples, including </a:t>
+            </a:r>
+            <a:r>
+              <a:rPr lang="en-US" dirty="0" err="1"/>
+              <a:t>CookieService</a:t>
+            </a:r>
+            <a:r>
+              <a:rPr lang="en-US" dirty="0"/>
+              <a:t> (static class in </a:t>
+            </a:r>
+            <a:r>
+              <a:rPr lang="en-US" dirty="0" err="1"/>
+              <a:t>Necko</a:t>
+            </a:r>
+            <a:r>
+              <a:rPr lang="en-US" dirty="0"/>
+              <a:t>)</a:t>
+            </a:r>
+          </a:p>
+          <a:p>
+            <a:r>
+              <a:rPr lang="en-US" dirty="0"/>
+              <a:t>Proxy</a:t>
+            </a:r>
+          </a:p>
+          <a:p>
+            <a:pPr lvl="1"/>
+            <a:r>
+              <a:rPr lang="en-US" dirty="0"/>
+              <a:t>Several classes accessed via proxy, including </a:t>
+            </a:r>
+            <a:r>
+              <a:rPr lang="en-US" dirty="0" err="1"/>
+              <a:t>nsCORSListenerProxy</a:t>
+            </a:r>
+            <a:endParaRPr lang="en-US" dirty="0"/>
+          </a:p>
+          <a:p>
+            <a:pPr lvl="1"/>
+            <a:r>
+              <a:rPr lang="en-US" dirty="0"/>
+              <a:t>Good for simplifying data access and security</a:t>
+            </a:r>
+          </a:p>
+          <a:p>
+            <a:r>
+              <a:rPr lang="en-US" dirty="0"/>
+              <a:t>Factory</a:t>
+            </a:r>
+          </a:p>
+          <a:p>
+            <a:pPr lvl="1"/>
+            <a:r>
+              <a:rPr lang="en-US" dirty="0" err="1"/>
+              <a:t>nsWidgetFactory</a:t>
+            </a:r>
+            <a:r>
+              <a:rPr lang="en-US" dirty="0"/>
+              <a:t>, but even more </a:t>
+            </a:r>
+            <a:r>
+              <a:rPr lang="en-US"/>
+              <a:t>generic with macros</a:t>
+            </a:r>
             <a:endParaRPr lang="en-US" dirty="0"/>
           </a:p>
         </p:txBody>
@@ -8603,20 +8561,13 @@
     </p:spTree>
     <p:extLst>
       <p:ext uri="{BB962C8B-B14F-4D97-AF65-F5344CB8AC3E}">
-        <p14:creationId xmlns:p14="http://schemas.microsoft.com/office/powerpoint/2010/main" val="1615861478"/>
+        <p14:creationId xmlns:p14="http://schemas.microsoft.com/office/powerpoint/2010/main" val="187624009"/>
       </p:ext>
     </p:extLst>
   </p:cSld>
   <p:clrMapOvr>
     <a:masterClrMapping/>
   </p:clrMapOvr>
-  <p:timing>
-    <p:tnLst>
-      <p:par>
-        <p:cTn id="1" dur="indefinite" restart="never" nodeType="tmRoot"/>
-      </p:par>
-    </p:tnLst>
-  </p:timing>
 </p:sld>
 </file>
 
@@ -8653,10 +8604,9 @@
           <a:lstStyle/>
           <a:p>
             <a:r>
-              <a:rPr lang="en-US" dirty="0" smtClean="0"/>
+              <a:rPr lang="en-US" dirty="0"/>
               <a:t>Critical Analysis -- Benefits</a:t>
             </a:r>
-            <a:endParaRPr lang="en-US" dirty="0"/>
           </a:p>
         </p:txBody>
       </p:sp>
@@ -8678,27 +8628,27 @@
           <a:lstStyle/>
           <a:p>
             <a:r>
-              <a:rPr lang="en-US" dirty="0" smtClean="0"/>
+              <a:rPr lang="en-US" dirty="0"/>
               <a:t>Firefox is Platform Independent </a:t>
             </a:r>
           </a:p>
           <a:p>
             <a:pPr lvl="1"/>
             <a:r>
-              <a:rPr lang="en-US" dirty="0" smtClean="0"/>
+              <a:rPr lang="en-US" dirty="0"/>
               <a:t>Due to its architecture’s reusable components, Firefox has been ported to and is available on most popular Operating Systems, leading to an often consistent user experience.</a:t>
             </a:r>
           </a:p>
           <a:p>
             <a:r>
-              <a:rPr lang="en-US" dirty="0" smtClean="0"/>
+              <a:rPr lang="en-US" dirty="0"/>
               <a:t>Firefox is maintainable</a:t>
             </a:r>
           </a:p>
           <a:p>
             <a:pPr lvl="1"/>
             <a:r>
-              <a:rPr lang="en-US" dirty="0" smtClean="0"/>
+              <a:rPr lang="en-US" dirty="0"/>
               <a:t>Layered Architecture</a:t>
             </a:r>
           </a:p>
@@ -8708,51 +8658,44 @@
               <a:rPr lang="en-US" dirty="0">
                 <a:sym typeface="Wingdings"/>
               </a:rPr>
-              <a:t>C</a:t>
-            </a:r>
-            <a:r>
-              <a:rPr lang="en-US" dirty="0" smtClean="0">
-                <a:sym typeface="Wingdings"/>
-              </a:rPr>
-              <a:t>omponents are restricted to only communicate with certain layers. Changes don’t usually affect the entire code base.</a:t>
-            </a:r>
-            <a:endParaRPr lang="en-US" dirty="0" smtClean="0"/>
-          </a:p>
-          <a:p>
-            <a:r>
-              <a:rPr lang="en-US" dirty="0" smtClean="0"/>
+              <a:t>Components are restricted to only communicate with certain layers. Changes don’t usually affect the entire code base.</a:t>
+            </a:r>
+            <a:endParaRPr lang="en-US" dirty="0"/>
+          </a:p>
+          <a:p>
+            <a:r>
+              <a:rPr lang="en-US" dirty="0"/>
               <a:t>Firefox is extensible</a:t>
             </a:r>
           </a:p>
           <a:p>
             <a:pPr lvl="1"/>
             <a:r>
-              <a:rPr lang="en-US" dirty="0" smtClean="0"/>
+              <a:rPr lang="en-US" dirty="0"/>
               <a:t>Many extensions are available</a:t>
             </a:r>
           </a:p>
           <a:p>
             <a:pPr lvl="1"/>
             <a:r>
-              <a:rPr lang="en-US" dirty="0" smtClean="0"/>
+              <a:rPr lang="en-US" dirty="0"/>
               <a:t>Extensions are independently built </a:t>
             </a:r>
             <a:r>
-              <a:rPr lang="mr-IN" dirty="0" smtClean="0"/>
+              <a:rPr lang="mr-IN" dirty="0"/>
               <a:t>–</a:t>
             </a:r>
             <a:r>
-              <a:rPr lang="en-US" dirty="0" smtClean="0"/>
+              <a:rPr lang="en-US" dirty="0"/>
               <a:t> can be easily installed and removed</a:t>
             </a:r>
           </a:p>
           <a:p>
             <a:pPr lvl="1"/>
             <a:r>
-              <a:rPr lang="en-US" dirty="0" smtClean="0"/>
+              <a:rPr lang="en-US" dirty="0"/>
               <a:t>Extensions can add a lot of interesting functionality not initially available</a:t>
             </a:r>
-            <a:endParaRPr lang="en-US" dirty="0"/>
           </a:p>
           <a:p>
             <a:pPr lvl="1"/>
@@ -8770,13 +8713,6 @@
   <p:clrMapOvr>
     <a:masterClrMapping/>
   </p:clrMapOvr>
-  <p:timing>
-    <p:tnLst>
-      <p:par>
-        <p:cTn id="1" dur="indefinite" restart="never" nodeType="tmRoot"/>
-      </p:par>
-    </p:tnLst>
-  </p:timing>
 </p:sld>
 </file>
 

</xml_diff>